<commit_message>
ppt formatting needs improvements
</commit_message>
<xml_diff>
--- a/Blind_Teaser_Final.pptx
+++ b/Blind_Teaser_Final.pptx
@@ -3098,8 +3098,8 @@
         </p:nvSpPr>
         <p:spPr>
           <a:xfrm>
-            <a:off x="457200" y="6400800"/>
-            <a:ext cx="8229600" cy="457200"/>
+            <a:off x="457200" y="274320"/>
+            <a:ext cx="8229600" cy="731520"/>
           </a:xfrm>
           <a:prstGeom prst="rect">
             <a:avLst/>
@@ -3112,29 +3112,65 @@
           </a:bodyPr>
           <a:lstStyle/>
           <a:p>
-            <a:pPr algn="ctr">
-              <a:defRPr sz="900">
+            <a:pPr>
+              <a:defRPr b="1" sz="2400">
                 <a:solidFill>
-                  <a:srgbClr val="808080"/>
+                  <a:srgbClr val="004B78"/>
                 </a:solidFill>
+                <a:latin typeface="Calibri"/>
               </a:defRPr>
             </a:pPr>
             <a:r>
-              <a:t>Strictly Private &amp; Confidential - Generated by Kelp AI</a:t>
-            </a:r>
-          </a:p>
-        </p:txBody>
-      </p:sp>
-      <p:sp>
-        <p:nvSpPr>
-          <p:cNvPr id="3" name="TextBox 2"/>
+              <a:t>Business Profile &amp; Infrastructure</a:t>
+            </a:r>
+          </a:p>
+        </p:txBody>
+      </p:sp>
+      <p:cxnSp>
+        <p:nvCxnSpPr>
+          <p:cNvPr id="3" name="Connector 2"/>
+          <p:cNvCxnSpPr/>
+          <p:nvPr/>
+        </p:nvCxnSpPr>
+        <p:spPr>
+          <a:xfrm>
+            <a:off x="457200" y="1005840"/>
+            <a:ext cx="8229600" cy="0"/>
+          </a:xfrm>
+          <a:prstGeom prst="line">
+            <a:avLst/>
+          </a:prstGeom>
+          <a:ln w="19050">
+            <a:solidFill>
+              <a:srgbClr val="C8C8C8"/>
+            </a:solidFill>
+          </a:ln>
+        </p:spPr>
+        <p:style>
+          <a:lnRef idx="2">
+            <a:schemeClr val="accent1"/>
+          </a:lnRef>
+          <a:fillRef idx="0">
+            <a:schemeClr val="accent1"/>
+          </a:fillRef>
+          <a:effectRef idx="1">
+            <a:schemeClr val="accent1"/>
+          </a:effectRef>
+          <a:fontRef idx="minor">
+            <a:schemeClr val="tx1"/>
+          </a:fontRef>
+        </p:style>
+      </p:cxnSp>
+      <p:sp>
+        <p:nvSpPr>
+          <p:cNvPr id="4" name="TextBox 3"/>
           <p:cNvSpPr txBox="1"/>
           <p:nvPr/>
         </p:nvSpPr>
         <p:spPr>
           <a:xfrm>
-            <a:off x="457200" y="365760"/>
-            <a:ext cx="8229600" cy="914400"/>
+            <a:off x="457200" y="6492240"/>
+            <a:ext cx="8229600" cy="365760"/>
           </a:xfrm>
           <a:prstGeom prst="rect">
             <a:avLst/>
@@ -3147,28 +3183,29 @@
           </a:bodyPr>
           <a:lstStyle/>
           <a:p>
-            <a:pPr>
-              <a:defRPr b="1" sz="2800">
+            <a:pPr algn="ctr">
+              <a:defRPr sz="900">
                 <a:solidFill>
-                  <a:srgbClr val="003366"/>
+                  <a:srgbClr val="969696"/>
                 </a:solidFill>
+                <a:latin typeface="Calibri"/>
               </a:defRPr>
             </a:pPr>
             <a:r>
-              <a:t>Business Profile &amp; Infrastructure</a:t>
-            </a:r>
-          </a:p>
-        </p:txBody>
-      </p:sp>
-      <p:sp>
-        <p:nvSpPr>
-          <p:cNvPr id="4" name="TextBox 3"/>
+              <a:t>Strictly Private &amp; Confidential – Prepared by Kelp M&amp;A Team</a:t>
+            </a:r>
+          </a:p>
+        </p:txBody>
+      </p:sp>
+      <p:sp>
+        <p:nvSpPr>
+          <p:cNvPr id="5" name="TextBox 4"/>
           <p:cNvSpPr txBox="1"/>
           <p:nvPr/>
         </p:nvSpPr>
         <p:spPr>
           <a:xfrm>
-            <a:off x="457200" y="1371600"/>
+            <a:off x="457200" y="1280160"/>
             <a:ext cx="4572000" cy="4572000"/>
           </a:xfrm>
           <a:prstGeom prst="rect">
@@ -3181,83 +3218,113 @@
             <a:spAutoFit/>
           </a:bodyPr>
           <a:lstStyle/>
+          <a:p/>
           <a:p>
             <a:pPr>
               <a:spcAft>
-                <a:spcPts val="1200"/>
+                <a:spcPts val="1000"/>
               </a:spcAft>
               <a:defRPr sz="1400">
                 <a:solidFill>
-                  <a:srgbClr val="404040"/>
+                  <a:srgbClr val="323232"/>
                 </a:solidFill>
+                <a:latin typeface="Calibri"/>
               </a:defRPr>
             </a:pPr>
             <a:r>
-              <a:t>• Manufactures precision medical devices.</a:t>
+              <a:t>• Manufactures automotive components.</a:t>
             </a:r>
           </a:p>
           <a:p>
             <a:pPr>
               <a:spcAft>
-                <a:spcPts val="1200"/>
+                <a:spcPts val="1000"/>
               </a:spcAft>
               <a:defRPr sz="1400">
                 <a:solidFill>
-                  <a:srgbClr val="404040"/>
+                  <a:srgbClr val="323232"/>
                 </a:solidFill>
+                <a:latin typeface="Calibri"/>
               </a:defRPr>
             </a:pPr>
             <a:r>
-              <a:t>• Segments include diagnostics, imaging, and therapy.</a:t>
+              <a:t>• Serves North America, Europe, and Asia.</a:t>
             </a:r>
           </a:p>
           <a:p>
             <a:pPr>
               <a:spcAft>
-                <a:spcPts val="1200"/>
+                <a:spcPts val="1000"/>
               </a:spcAft>
               <a:defRPr sz="1400">
                 <a:solidFill>
-                  <a:srgbClr val="404040"/>
+                  <a:srgbClr val="323232"/>
                 </a:solidFill>
+                <a:latin typeface="Calibri"/>
               </a:defRPr>
             </a:pPr>
             <a:r>
-              <a:t>• Operates 3 facilities in Europe &amp; Asia.</a:t>
+              <a:t>• Operates 3 plants with combined capacity of 500k units/year.</a:t>
             </a:r>
           </a:p>
           <a:p>
             <a:pPr>
               <a:spcAft>
-                <a:spcPts val="1200"/>
+                <a:spcPts val="1000"/>
               </a:spcAft>
               <a:defRPr sz="1400">
                 <a:solidFill>
-                  <a:srgbClr val="404040"/>
+                  <a:srgbClr val="323232"/>
                 </a:solidFill>
+                <a:latin typeface="Calibri"/>
               </a:defRPr>
             </a:pPr>
             <a:r>
-              <a:t>• ISO 13485 certified for medical devices.</a:t>
+              <a:t>• ISO 9001 &amp; IATF certified facilities.</a:t>
             </a:r>
           </a:p>
           <a:p>
             <a:pPr>
               <a:spcAft>
-                <a:spcPts val="1200"/>
+                <a:spcPts val="1000"/>
               </a:spcAft>
               <a:defRPr sz="1400">
                 <a:solidFill>
-                  <a:srgbClr val="404040"/>
+                  <a:srgbClr val="323232"/>
                 </a:solidFill>
+                <a:latin typeface="Calibri"/>
               </a:defRPr>
             </a:pPr>
             <a:r>
-              <a:t>• Serves hospitals, clinics, and research institutions.</a:t>
-            </a:r>
-          </a:p>
-        </p:txBody>
-      </p:sp>
+              <a:t>• End-users include major automotive OEMs.</a:t>
+            </a:r>
+          </a:p>
+        </p:txBody>
+      </p:sp>
+      <p:pic>
+        <p:nvPicPr>
+          <p:cNvPr id="6" name="Picture 5" descr="temp_img_0.jpg"/>
+          <p:cNvPicPr>
+            <a:picLocks noChangeAspect="1"/>
+          </p:cNvPicPr>
+          <p:nvPr/>
+        </p:nvPicPr>
+        <p:blipFill>
+          <a:blip r:embed="rId2"/>
+          <a:stretch>
+            <a:fillRect/>
+          </a:stretch>
+        </p:blipFill>
+        <p:spPr>
+          <a:xfrm>
+            <a:off x="5303520" y="1371600"/>
+            <a:ext cx="3474720" cy="2606040"/>
+          </a:xfrm>
+          <a:prstGeom prst="rect">
+            <a:avLst/>
+          </a:prstGeom>
+        </p:spPr>
+      </p:pic>
     </p:spTree>
   </p:cSld>
   <p:clrMapOvr>
@@ -3284,8 +3351,8 @@
         </p:nvSpPr>
         <p:spPr>
           <a:xfrm>
-            <a:off x="457200" y="6400800"/>
-            <a:ext cx="8229600" cy="457200"/>
+            <a:off x="457200" y="274320"/>
+            <a:ext cx="8229600" cy="731520"/>
           </a:xfrm>
           <a:prstGeom prst="rect">
             <a:avLst/>
@@ -3298,29 +3365,65 @@
           </a:bodyPr>
           <a:lstStyle/>
           <a:p>
-            <a:pPr algn="ctr">
-              <a:defRPr sz="900">
+            <a:pPr>
+              <a:defRPr b="1" sz="2400">
                 <a:solidFill>
-                  <a:srgbClr val="808080"/>
+                  <a:srgbClr val="004B78"/>
                 </a:solidFill>
+                <a:latin typeface="Calibri"/>
               </a:defRPr>
             </a:pPr>
             <a:r>
-              <a:t>Strictly Private &amp; Confidential - Generated by Kelp AI</a:t>
-            </a:r>
-          </a:p>
-        </p:txBody>
-      </p:sp>
-      <p:sp>
-        <p:nvSpPr>
-          <p:cNvPr id="3" name="TextBox 2"/>
+              <a:t>Financial &amp; Operational Scale</a:t>
+            </a:r>
+          </a:p>
+        </p:txBody>
+      </p:sp>
+      <p:cxnSp>
+        <p:nvCxnSpPr>
+          <p:cNvPr id="3" name="Connector 2"/>
+          <p:cNvCxnSpPr/>
+          <p:nvPr/>
+        </p:nvCxnSpPr>
+        <p:spPr>
+          <a:xfrm>
+            <a:off x="457200" y="1005840"/>
+            <a:ext cx="8229600" cy="0"/>
+          </a:xfrm>
+          <a:prstGeom prst="line">
+            <a:avLst/>
+          </a:prstGeom>
+          <a:ln w="19050">
+            <a:solidFill>
+              <a:srgbClr val="C8C8C8"/>
+            </a:solidFill>
+          </a:ln>
+        </p:spPr>
+        <p:style>
+          <a:lnRef idx="2">
+            <a:schemeClr val="accent1"/>
+          </a:lnRef>
+          <a:fillRef idx="0">
+            <a:schemeClr val="accent1"/>
+          </a:fillRef>
+          <a:effectRef idx="1">
+            <a:schemeClr val="accent1"/>
+          </a:effectRef>
+          <a:fontRef idx="minor">
+            <a:schemeClr val="tx1"/>
+          </a:fontRef>
+        </p:style>
+      </p:cxnSp>
+      <p:sp>
+        <p:nvSpPr>
+          <p:cNvPr id="4" name="TextBox 3"/>
           <p:cNvSpPr txBox="1"/>
           <p:nvPr/>
         </p:nvSpPr>
         <p:spPr>
           <a:xfrm>
-            <a:off x="457200" y="365760"/>
-            <a:ext cx="8229600" cy="914400"/>
+            <a:off x="457200" y="6492240"/>
+            <a:ext cx="8229600" cy="365760"/>
           </a:xfrm>
           <a:prstGeom prst="rect">
             <a:avLst/>
@@ -3333,28 +3436,29 @@
           </a:bodyPr>
           <a:lstStyle/>
           <a:p>
-            <a:pPr>
-              <a:defRPr b="1" sz="2800">
+            <a:pPr algn="ctr">
+              <a:defRPr sz="900">
                 <a:solidFill>
-                  <a:srgbClr val="003366"/>
+                  <a:srgbClr val="969696"/>
                 </a:solidFill>
+                <a:latin typeface="Calibri"/>
               </a:defRPr>
             </a:pPr>
             <a:r>
-              <a:t>Financial &amp; Operational Scale</a:t>
-            </a:r>
-          </a:p>
-        </p:txBody>
-      </p:sp>
-      <p:sp>
-        <p:nvSpPr>
-          <p:cNvPr id="4" name="TextBox 3"/>
+              <a:t>Strictly Private &amp; Confidential – Prepared by Kelp M&amp;A Team</a:t>
+            </a:r>
+          </a:p>
+        </p:txBody>
+      </p:sp>
+      <p:sp>
+        <p:nvSpPr>
+          <p:cNvPr id="5" name="TextBox 4"/>
           <p:cNvSpPr txBox="1"/>
           <p:nvPr/>
         </p:nvSpPr>
         <p:spPr>
           <a:xfrm>
-            <a:off x="457200" y="1371600"/>
+            <a:off x="457200" y="1280160"/>
             <a:ext cx="4572000" cy="4572000"/>
           </a:xfrm>
           <a:prstGeom prst="rect">
@@ -3367,83 +3471,97 @@
             <a:spAutoFit/>
           </a:bodyPr>
           <a:lstStyle/>
+          <a:p/>
           <a:p>
             <a:pPr>
               <a:spcAft>
-                <a:spcPts val="1200"/>
+                <a:spcPts val="1000"/>
               </a:spcAft>
               <a:defRPr sz="1400">
                 <a:solidFill>
-                  <a:srgbClr val="404040"/>
+                  <a:srgbClr val="323232"/>
                 </a:solidFill>
+                <a:latin typeface="Calibri"/>
               </a:defRPr>
             </a:pPr>
             <a:r>
-              <a:t>• Revenue of $200M in 2021, up 5% from 2020.</a:t>
+              <a:t>• Revenue of $150M in 2022, up 10% from 2021.</a:t>
             </a:r>
           </a:p>
           <a:p>
             <a:pPr>
               <a:spcAft>
-                <a:spcPts val="1200"/>
+                <a:spcPts val="1000"/>
               </a:spcAft>
               <a:defRPr sz="1400">
                 <a:solidFill>
-                  <a:srgbClr val="404040"/>
+                  <a:srgbClr val="323232"/>
                 </a:solidFill>
+                <a:latin typeface="Calibri"/>
               </a:defRPr>
             </a:pPr>
             <a:r>
-              <a:t>• EBITDA margin at 30%, stable over last 3 years.</a:t>
+              <a:t>• EBITDA margin of 18.5% in 2022.</a:t>
             </a:r>
           </a:p>
           <a:p>
             <a:pPr>
               <a:spcAft>
-                <a:spcPts val="1200"/>
+                <a:spcPts val="1000"/>
               </a:spcAft>
               <a:defRPr sz="1400">
                 <a:solidFill>
-                  <a:srgbClr val="404040"/>
+                  <a:srgbClr val="323232"/>
                 </a:solidFill>
+                <a:latin typeface="Calibri"/>
               </a:defRPr>
             </a:pPr>
             <a:r>
-              <a:t>• Headcount of 1,200 employees globally.</a:t>
+              <a:t>• Headcount of 1,200 employees across operations.</a:t>
             </a:r>
           </a:p>
           <a:p>
             <a:pPr>
               <a:spcAft>
-                <a:spcPts val="1200"/>
+                <a:spcPts val="1000"/>
               </a:spcAft>
               <a:defRPr sz="1400">
                 <a:solidFill>
-                  <a:srgbClr val="404040"/>
+                  <a:srgbClr val="323232"/>
                 </a:solidFill>
+                <a:latin typeface="Calibri"/>
               </a:defRPr>
             </a:pPr>
             <a:r>
-              <a:t>• Asset base valued at $500M, with R&amp;D investments.</a:t>
-            </a:r>
-          </a:p>
-          <a:p>
-            <a:pPr>
-              <a:spcAft>
-                <a:spcPts val="1200"/>
-              </a:spcAft>
-              <a:defRPr sz="1400">
-                <a:solidFill>
-                  <a:srgbClr val="404040"/>
-                </a:solidFill>
-              </a:defRPr>
-            </a:pPr>
-            <a:r>
-              <a:t>• Completed a major expansion in Q4 2021.</a:t>
-            </a:r>
-          </a:p>
-        </p:txBody>
-      </p:sp>
+              <a:t>• Asset base valued at $300M with recent CAPEX of $50M for expansion.</a:t>
+            </a:r>
+          </a:p>
+        </p:txBody>
+      </p:sp>
+      <p:pic>
+        <p:nvPicPr>
+          <p:cNvPr id="6" name="Picture 5" descr="temp_img_1.jpg"/>
+          <p:cNvPicPr>
+            <a:picLocks noChangeAspect="1"/>
+          </p:cNvPicPr>
+          <p:nvPr/>
+        </p:nvPicPr>
+        <p:blipFill>
+          <a:blip r:embed="rId2"/>
+          <a:stretch>
+            <a:fillRect/>
+          </a:stretch>
+        </p:blipFill>
+        <p:spPr>
+          <a:xfrm>
+            <a:off x="5303520" y="1371600"/>
+            <a:ext cx="3474720" cy="2606040"/>
+          </a:xfrm>
+          <a:prstGeom prst="rect">
+            <a:avLst/>
+          </a:prstGeom>
+        </p:spPr>
+      </p:pic>
     </p:spTree>
   </p:cSld>
   <p:clrMapOvr>
@@ -3470,8 +3588,8 @@
         </p:nvSpPr>
         <p:spPr>
           <a:xfrm>
-            <a:off x="457200" y="6400800"/>
-            <a:ext cx="8229600" cy="457200"/>
+            <a:off x="457200" y="274320"/>
+            <a:ext cx="8229600" cy="731520"/>
           </a:xfrm>
           <a:prstGeom prst="rect">
             <a:avLst/>
@@ -3484,29 +3602,65 @@
           </a:bodyPr>
           <a:lstStyle/>
           <a:p>
-            <a:pPr algn="ctr">
-              <a:defRPr sz="900">
+            <a:pPr>
+              <a:defRPr b="1" sz="2400">
                 <a:solidFill>
-                  <a:srgbClr val="808080"/>
+                  <a:srgbClr val="004B78"/>
                 </a:solidFill>
+                <a:latin typeface="Calibri"/>
               </a:defRPr>
             </a:pPr>
             <a:r>
-              <a:t>Strictly Private &amp; Confidential - Generated by Kelp AI</a:t>
-            </a:r>
-          </a:p>
-        </p:txBody>
-      </p:sp>
-      <p:sp>
-        <p:nvSpPr>
-          <p:cNvPr id="3" name="TextBox 2"/>
+              <a:t>Investment Highlights</a:t>
+            </a:r>
+          </a:p>
+        </p:txBody>
+      </p:sp>
+      <p:cxnSp>
+        <p:nvCxnSpPr>
+          <p:cNvPr id="3" name="Connector 2"/>
+          <p:cNvCxnSpPr/>
+          <p:nvPr/>
+        </p:nvCxnSpPr>
+        <p:spPr>
+          <a:xfrm>
+            <a:off x="457200" y="1005840"/>
+            <a:ext cx="8229600" cy="0"/>
+          </a:xfrm>
+          <a:prstGeom prst="line">
+            <a:avLst/>
+          </a:prstGeom>
+          <a:ln w="19050">
+            <a:solidFill>
+              <a:srgbClr val="C8C8C8"/>
+            </a:solidFill>
+          </a:ln>
+        </p:spPr>
+        <p:style>
+          <a:lnRef idx="2">
+            <a:schemeClr val="accent1"/>
+          </a:lnRef>
+          <a:fillRef idx="0">
+            <a:schemeClr val="accent1"/>
+          </a:fillRef>
+          <a:effectRef idx="1">
+            <a:schemeClr val="accent1"/>
+          </a:effectRef>
+          <a:fontRef idx="minor">
+            <a:schemeClr val="tx1"/>
+          </a:fontRef>
+        </p:style>
+      </p:cxnSp>
+      <p:sp>
+        <p:nvSpPr>
+          <p:cNvPr id="4" name="TextBox 3"/>
           <p:cNvSpPr txBox="1"/>
           <p:nvPr/>
         </p:nvSpPr>
         <p:spPr>
           <a:xfrm>
-            <a:off x="457200" y="365760"/>
-            <a:ext cx="8229600" cy="914400"/>
+            <a:off x="457200" y="6492240"/>
+            <a:ext cx="8229600" cy="365760"/>
           </a:xfrm>
           <a:prstGeom prst="rect">
             <a:avLst/>
@@ -3519,28 +3673,29 @@
           </a:bodyPr>
           <a:lstStyle/>
           <a:p>
-            <a:pPr>
-              <a:defRPr b="1" sz="2800">
+            <a:pPr algn="ctr">
+              <a:defRPr sz="900">
                 <a:solidFill>
-                  <a:srgbClr val="003366"/>
+                  <a:srgbClr val="969696"/>
                 </a:solidFill>
+                <a:latin typeface="Calibri"/>
               </a:defRPr>
             </a:pPr>
             <a:r>
-              <a:t>Investment Highlights</a:t>
-            </a:r>
-          </a:p>
-        </p:txBody>
-      </p:sp>
-      <p:sp>
-        <p:nvSpPr>
-          <p:cNvPr id="4" name="TextBox 3"/>
+              <a:t>Strictly Private &amp; Confidential – Prepared by Kelp M&amp;A Team</a:t>
+            </a:r>
+          </a:p>
+        </p:txBody>
+      </p:sp>
+      <p:sp>
+        <p:nvSpPr>
+          <p:cNvPr id="5" name="TextBox 4"/>
           <p:cNvSpPr txBox="1"/>
           <p:nvPr/>
         </p:nvSpPr>
         <p:spPr>
           <a:xfrm>
-            <a:off x="457200" y="1371600"/>
+            <a:off x="457200" y="1280160"/>
             <a:ext cx="4572000" cy="4572000"/>
           </a:xfrm>
           <a:prstGeom prst="rect">
@@ -3553,68 +3708,97 @@
             <a:spAutoFit/>
           </a:bodyPr>
           <a:lstStyle/>
+          <a:p/>
           <a:p>
             <a:pPr>
               <a:spcAft>
-                <a:spcPts val="1200"/>
+                <a:spcPts val="1000"/>
               </a:spcAft>
               <a:defRPr sz="1400">
                 <a:solidFill>
-                  <a:srgbClr val="404040"/>
+                  <a:srgbClr val="323232"/>
                 </a:solidFill>
+                <a:latin typeface="Calibri"/>
               </a:defRPr>
             </a:pPr>
             <a:r>
-              <a:t>• Patented technology for faster diagnostic processes.</a:t>
+              <a:t>• Patented manufacturing process reduces costs by 20%.</a:t>
             </a:r>
           </a:p>
           <a:p>
             <a:pPr>
               <a:spcAft>
-                <a:spcPts val="1200"/>
+                <a:spcPts val="1000"/>
               </a:spcAft>
               <a:defRPr sz="1400">
                 <a:solidFill>
-                  <a:srgbClr val="404040"/>
+                  <a:srgbClr val="323232"/>
                 </a:solidFill>
+                <a:latin typeface="Calibri"/>
               </a:defRPr>
             </a:pPr>
             <a:r>
-              <a:t>• Key client: Top 3 global healthcare providers.</a:t>
+              <a:t>• Key client: Ford Motor Company, with long-term supply agreement.</a:t>
             </a:r>
           </a:p>
           <a:p>
             <a:pPr>
               <a:spcAft>
-                <a:spcPts val="1200"/>
+                <a:spcPts val="1000"/>
               </a:spcAft>
               <a:defRPr sz="1400">
                 <a:solidFill>
-                  <a:srgbClr val="404040"/>
+                  <a:srgbClr val="323232"/>
                 </a:solidFill>
+                <a:latin typeface="Calibri"/>
               </a:defRPr>
             </a:pPr>
             <a:r>
-              <a:t>• Order book of $50M, with contracts extending to 2026.</a:t>
+              <a:t>• Order book for next 12 months exceeds $200M.</a:t>
             </a:r>
           </a:p>
           <a:p>
             <a:pPr>
               <a:spcAft>
-                <a:spcPts val="1200"/>
+                <a:spcPts val="1000"/>
               </a:spcAft>
               <a:defRPr sz="1400">
                 <a:solidFill>
-                  <a:srgbClr val="404040"/>
+                  <a:srgbClr val="323232"/>
                 </a:solidFill>
+                <a:latin typeface="Calibri"/>
               </a:defRPr>
             </a:pPr>
             <a:r>
-              <a:t>• Management team with over 50 years combined experience.</a:t>
-            </a:r>
-          </a:p>
-        </p:txBody>
-      </p:sp>
+              <a:t>• Management team has over 100 years of combined experience in automotive industry.</a:t>
+            </a:r>
+          </a:p>
+        </p:txBody>
+      </p:sp>
+      <p:pic>
+        <p:nvPicPr>
+          <p:cNvPr id="6" name="Picture 5" descr="temp_img_2.jpg"/>
+          <p:cNvPicPr>
+            <a:picLocks noChangeAspect="1"/>
+          </p:cNvPicPr>
+          <p:nvPr/>
+        </p:nvPicPr>
+        <p:blipFill>
+          <a:blip r:embed="rId2"/>
+          <a:stretch>
+            <a:fillRect/>
+          </a:stretch>
+        </p:blipFill>
+        <p:spPr>
+          <a:xfrm>
+            <a:off x="5303520" y="1371600"/>
+            <a:ext cx="3474720" cy="2606040"/>
+          </a:xfrm>
+          <a:prstGeom prst="rect">
+            <a:avLst/>
+          </a:prstGeom>
+        </p:spPr>
+      </p:pic>
     </p:spTree>
   </p:cSld>
   <p:clrMapOvr>

</xml_diff>

<commit_message>
graphs coming but not images
</commit_message>
<xml_diff>
--- a/Blind_Teaser_Final.pptx
+++ b/Blind_Teaser_Final.pptx
@@ -9,6 +9,7 @@
     <p:sldId id="257" r:id="rId8"/>
     <p:sldId id="258" r:id="rId9"/>
     <p:sldId id="259" r:id="rId10"/>
+    <p:sldId id="260" r:id="rId11"/>
   </p:sldIdLst>
   <p:sldSz cx="9144000" cy="6858000" type="screen4x3"/>
   <p:notesSz cx="6858000" cy="9144000"/>
@@ -108,6 +109,136 @@
     </a:lvl9pPr>
   </p:defaultTextStyle>
 </p:presentation>
+</file>
+
+<file path=ppt/charts/chart1.xml><?xml version="1.0" encoding="utf-8"?>
+<c:chartSpace xmlns:c="http://schemas.openxmlformats.org/drawingml/2006/chart" xmlns:a="http://schemas.openxmlformats.org/drawingml/2006/main" xmlns:r="http://schemas.openxmlformats.org/officeDocument/2006/relationships">
+  <c:date1904 val="0"/>
+  <c:chart>
+    <c:title>
+      <c:tx>
+        <c:rich>
+          <a:bodyPr/>
+          <a:lstStyle/>
+          <a:p>
+            <a:pPr>
+              <a:defRPr sz="1200" b="1">
+                <a:latin typeface="Arial"/>
+              </a:defRPr>
+            </a:pPr>
+            <a:r>
+              <a:t>Revenue Trend</a:t>
+            </a:r>
+          </a:p>
+        </c:rich>
+      </c:tx>
+      <c:layout/>
+      <c:overlay val="0"/>
+    </c:title>
+    <c:autoTitleDeleted val="0"/>
+    <c:plotArea>
+      <c:barChart>
+        <c:barDir val="col"/>
+        <c:grouping val="clustered"/>
+        <c:ser>
+          <c:idx val="0"/>
+          <c:order val="0"/>
+          <c:tx>
+            <c:strRef>
+              <c:f>Sheet1!$B$1</c:f>
+              <c:strCache>
+                <c:ptCount val="1"/>
+                <c:pt idx="0">
+                  <c:v>Series 1</c:v>
+                </c:pt>
+              </c:strCache>
+            </c:strRef>
+          </c:tx>
+          <c:cat>
+            <c:strRef>
+              <c:f>Sheet1!$A$2:$A$4</c:f>
+              <c:strCache>
+                <c:ptCount val="3"/>
+                <c:pt idx="0">
+                  <c:v>2019</c:v>
+                </c:pt>
+                <c:pt idx="1">
+                  <c:v>2020</c:v>
+                </c:pt>
+                <c:pt idx="2">
+                  <c:v>2021</c:v>
+                </c:pt>
+              </c:strCache>
+            </c:strRef>
+          </c:cat>
+          <c:val>
+            <c:numRef>
+              <c:f>Sheet1!$B$2:$B$4</c:f>
+              <c:numCache>
+                <c:formatCode>General</c:formatCode>
+                <c:ptCount val="3"/>
+                <c:pt idx="0">
+                  <c:v>53.6</c:v>
+                </c:pt>
+                <c:pt idx="1">
+                  <c:v>-97.8</c:v>
+                </c:pt>
+                <c:pt idx="2">
+                  <c:v>23.5</c:v>
+                </c:pt>
+              </c:numCache>
+            </c:numRef>
+          </c:val>
+        </c:ser>
+        <c:axId val="-2068027336"/>
+        <c:axId val="-2113994440"/>
+      </c:barChart>
+      <c:catAx>
+        <c:axId val="-2068027336"/>
+        <c:scaling>
+          <c:orientation val="minMax"/>
+        </c:scaling>
+        <c:delete val="0"/>
+        <c:axPos val="b"/>
+        <c:majorTickMark val="out"/>
+        <c:minorTickMark val="none"/>
+        <c:tickLblPos val="nextTo"/>
+        <c:crossAx val="-2113994440"/>
+        <c:crosses val="autoZero"/>
+        <c:auto val="1"/>
+        <c:lblAlgn val="ctr"/>
+        <c:lblOffset val="100"/>
+        <c:noMultiLvlLbl val="0"/>
+      </c:catAx>
+      <c:valAx>
+        <c:axId val="-2113994440"/>
+        <c:scaling/>
+        <c:delete val="0"/>
+        <c:axPos val="l"/>
+        <c:majorGridlines/>
+        <c:majorTickMark val="out"/>
+        <c:minorTickMark val="none"/>
+        <c:tickLblPos val="nextTo"/>
+        <c:crossAx val="-2068027336"/>
+        <c:crosses val="autoZero"/>
+      </c:valAx>
+    </c:plotArea>
+    <c:dispBlanksAs val="gap"/>
+  </c:chart>
+  <c:txPr>
+    <a:bodyPr/>
+    <a:lstStyle/>
+    <a:p>
+      <a:pPr>
+        <a:defRPr sz="1800"/>
+      </a:pPr>
+      <a:endParaRPr lang="en-US"/>
+    </a:p>
+  </c:txPr>
+  <c:externalData r:id="rId1">
+    <c:autoUpdate val="0"/>
+  </c:externalData>
+</c:chartSpace>
 </file>
 
 <file path=ppt/slideLayouts/slideLayout1.xml><?xml version="1.0" encoding="utf-8"?>
@@ -3150,6 +3281,42 @@
         </p:nvSpPr>
         <p:spPr>
           <a:xfrm>
+            <a:off x="6858000" y="457200"/>
+            <a:ext cx="1828800" cy="457200"/>
+          </a:xfrm>
+          <a:prstGeom prst="rect">
+            <a:avLst/>
+          </a:prstGeom>
+          <a:noFill/>
+        </p:spPr>
+        <p:txBody>
+          <a:bodyPr wrap="none">
+            <a:spAutoFit/>
+          </a:bodyPr>
+          <a:lstStyle/>
+          <a:p>
+            <a:pPr algn="r">
+              <a:defRPr b="1" sz="1800">
+                <a:solidFill>
+                  <a:srgbClr val="FFFFFF"/>
+                </a:solidFill>
+                <a:latin typeface="Arial"/>
+              </a:defRPr>
+            </a:pPr>
+            <a:r>
+              <a:t>KELP</a:t>
+            </a:r>
+          </a:p>
+        </p:txBody>
+      </p:sp>
+      <p:sp>
+        <p:nvSpPr>
+          <p:cNvPr id="4" name="TextBox 3"/>
+          <p:cNvSpPr txBox="1"/>
+          <p:nvPr/>
+        </p:nvSpPr>
+        <p:spPr>
+          <a:xfrm>
             <a:off x="914400" y="2743200"/>
             <a:ext cx="5486400" cy="1828800"/>
           </a:xfrm>
@@ -3184,7 +3351,7 @@
       </p:sp>
       <p:sp>
         <p:nvSpPr>
-          <p:cNvPr id="4" name="TextBox 3"/>
+          <p:cNvPr id="5" name="TextBox 4"/>
           <p:cNvSpPr txBox="1"/>
           <p:nvPr/>
         </p:nvSpPr>
@@ -3213,7 +3380,7 @@
               </a:defRPr>
             </a:pPr>
             <a:r>
-              <a:t>Strictly Private &amp; Confidential</a:t>
+              <a:t>Strictly Private &amp; Confidential – Prepared by Kelp M&amp;A Team</a:t>
             </a:r>
           </a:p>
         </p:txBody>
@@ -3244,8 +3411,44 @@
         </p:nvSpPr>
         <p:spPr>
           <a:xfrm>
+            <a:off x="7315200" y="182880"/>
+            <a:ext cx="1371600" cy="457200"/>
+          </a:xfrm>
+          <a:prstGeom prst="rect">
+            <a:avLst/>
+          </a:prstGeom>
+          <a:noFill/>
+        </p:spPr>
+        <p:txBody>
+          <a:bodyPr wrap="none">
+            <a:spAutoFit/>
+          </a:bodyPr>
+          <a:lstStyle/>
+          <a:p>
+            <a:pPr algn="r">
+              <a:defRPr b="1" sz="1400">
+                <a:solidFill>
+                  <a:srgbClr val="2E004B"/>
+                </a:solidFill>
+                <a:latin typeface="Arial"/>
+              </a:defRPr>
+            </a:pPr>
+            <a:r>
+              <a:t>KELP</a:t>
+            </a:r>
+          </a:p>
+        </p:txBody>
+      </p:sp>
+      <p:sp>
+        <p:nvSpPr>
+          <p:cNvPr id="3" name="TextBox 2"/>
+          <p:cNvSpPr txBox="1"/>
+          <p:nvPr/>
+        </p:nvSpPr>
+        <p:spPr>
+          <a:xfrm>
             <a:off x="457200" y="365760"/>
-            <a:ext cx="8229600" cy="731520"/>
+            <a:ext cx="6858000" cy="731520"/>
           </a:xfrm>
           <a:prstGeom prst="rect">
             <a:avLst/>
@@ -3274,7 +3477,7 @@
       </p:sp>
       <p:cxnSp>
         <p:nvCxnSpPr>
-          <p:cNvPr id="3" name="Connector 2"/>
+          <p:cNvPr id="4" name="Connector 3"/>
           <p:cNvCxnSpPr/>
           <p:nvPr/>
         </p:nvCxnSpPr>
@@ -3309,7 +3512,7 @@
       </p:cxnSp>
       <p:sp>
         <p:nvSpPr>
-          <p:cNvPr id="4" name="TextBox 3"/>
+          <p:cNvPr id="5" name="TextBox 4"/>
           <p:cNvSpPr txBox="1"/>
           <p:nvPr/>
         </p:nvSpPr>
@@ -3329,23 +3532,23 @@
           </a:bodyPr>
           <a:lstStyle/>
           <a:p>
-            <a:pPr algn="r">
+            <a:pPr algn="ctr">
               <a:defRPr sz="900">
                 <a:solidFill>
-                  <a:srgbClr val="B4B4B4"/>
+                  <a:srgbClr val="969696"/>
                 </a:solidFill>
                 <a:latin typeface="Arial"/>
               </a:defRPr>
             </a:pPr>
             <a:r>
-              <a:t>Strictly Private &amp; Confidential – Project Apex</a:t>
-            </a:r>
-          </a:p>
-        </p:txBody>
-      </p:sp>
-      <p:sp>
-        <p:nvSpPr>
-          <p:cNvPr id="5" name="TextBox 4"/>
+              <a:t>Strictly Private &amp; Confidential – Prepared by Kelp M&amp;A Team</a:t>
+            </a:r>
+          </a:p>
+        </p:txBody>
+      </p:sp>
+      <p:sp>
+        <p:nvSpPr>
+          <p:cNvPr id="6" name="TextBox 5"/>
           <p:cNvSpPr txBox="1"/>
           <p:nvPr/>
         </p:nvSpPr>
@@ -3378,7 +3581,7 @@
               </a:defRPr>
             </a:pPr>
             <a:r>
-              <a:t>■ Manufactures automotive components.</a:t>
+              <a:t>■ Operates in automotive and aerospace sectors.</a:t>
             </a:r>
           </a:p>
           <a:p>
@@ -3394,7 +3597,7 @@
               </a:defRPr>
             </a:pPr>
             <a:r>
-              <a:t>■ Serves North America, Europe, and Asia.</a:t>
+              <a:t>■ Manufactures forged components for engines.</a:t>
             </a:r>
           </a:p>
           <a:p>
@@ -3410,7 +3613,7 @@
               </a:defRPr>
             </a:pPr>
             <a:r>
-              <a:t>■ Operates 3 plants with combined capacity of 500k units/year.</a:t>
+              <a:t>■ Owns a manufacturing plant in Detroit, USA.</a:t>
             </a:r>
           </a:p>
           <a:p>
@@ -3426,51 +3629,11 @@
               </a:defRPr>
             </a:pPr>
             <a:r>
-              <a:t>■ ISO 9001 &amp; IATF certified facilities.</a:t>
-            </a:r>
-          </a:p>
-          <a:p>
-            <a:pPr>
-              <a:spcAft>
-                <a:spcPts val="1200"/>
-              </a:spcAft>
-              <a:defRPr sz="1100">
-                <a:solidFill>
-                  <a:srgbClr val="3C3C3C"/>
-                </a:solidFill>
-                <a:latin typeface="Arial"/>
-              </a:defRPr>
-            </a:pPr>
-            <a:r>
-              <a:t>■ End-users include major automotive OEMs.</a:t>
-            </a:r>
-          </a:p>
-        </p:txBody>
-      </p:sp>
-      <p:pic>
-        <p:nvPicPr>
-          <p:cNvPr id="6" name="Picture 5" descr="temp_img_0.jpg"/>
-          <p:cNvPicPr>
-            <a:picLocks noChangeAspect="1"/>
-          </p:cNvPicPr>
-          <p:nvPr/>
-        </p:nvPicPr>
-        <p:blipFill>
-          <a:blip r:embed="rId2"/>
-          <a:stretch>
-            <a:fillRect/>
-          </a:stretch>
-        </p:blipFill>
-        <p:spPr>
-          <a:xfrm>
-            <a:off x="5029200" y="1371600"/>
-            <a:ext cx="4114800" cy="3086100"/>
-          </a:xfrm>
-          <a:prstGeom prst="rect">
-            <a:avLst/>
-          </a:prstGeom>
-        </p:spPr>
-      </p:pic>
+              <a:t>■ ISO 9001 certified for quality management.</a:t>
+            </a:r>
+          </a:p>
+        </p:txBody>
+      </p:sp>
     </p:spTree>
   </p:cSld>
   <p:clrMapOvr>
@@ -3497,8 +3660,44 @@
         </p:nvSpPr>
         <p:spPr>
           <a:xfrm>
+            <a:off x="7315200" y="182880"/>
+            <a:ext cx="1371600" cy="457200"/>
+          </a:xfrm>
+          <a:prstGeom prst="rect">
+            <a:avLst/>
+          </a:prstGeom>
+          <a:noFill/>
+        </p:spPr>
+        <p:txBody>
+          <a:bodyPr wrap="none">
+            <a:spAutoFit/>
+          </a:bodyPr>
+          <a:lstStyle/>
+          <a:p>
+            <a:pPr algn="r">
+              <a:defRPr b="1" sz="1400">
+                <a:solidFill>
+                  <a:srgbClr val="2E004B"/>
+                </a:solidFill>
+                <a:latin typeface="Arial"/>
+              </a:defRPr>
+            </a:pPr>
+            <a:r>
+              <a:t>KELP</a:t>
+            </a:r>
+          </a:p>
+        </p:txBody>
+      </p:sp>
+      <p:sp>
+        <p:nvSpPr>
+          <p:cNvPr id="3" name="TextBox 2"/>
+          <p:cNvSpPr txBox="1"/>
+          <p:nvPr/>
+        </p:nvSpPr>
+        <p:spPr>
+          <a:xfrm>
             <a:off x="457200" y="365760"/>
-            <a:ext cx="8229600" cy="731520"/>
+            <a:ext cx="6858000" cy="731520"/>
           </a:xfrm>
           <a:prstGeom prst="rect">
             <a:avLst/>
@@ -3527,7 +3726,7 @@
       </p:sp>
       <p:cxnSp>
         <p:nvCxnSpPr>
-          <p:cNvPr id="3" name="Connector 2"/>
+          <p:cNvPr id="4" name="Connector 3"/>
           <p:cNvCxnSpPr/>
           <p:nvPr/>
         </p:nvCxnSpPr>
@@ -3562,7 +3761,7 @@
       </p:cxnSp>
       <p:sp>
         <p:nvSpPr>
-          <p:cNvPr id="4" name="TextBox 3"/>
+          <p:cNvPr id="5" name="TextBox 4"/>
           <p:cNvSpPr txBox="1"/>
           <p:nvPr/>
         </p:nvSpPr>
@@ -3582,23 +3781,23 @@
           </a:bodyPr>
           <a:lstStyle/>
           <a:p>
-            <a:pPr algn="r">
+            <a:pPr algn="ctr">
               <a:defRPr sz="900">
                 <a:solidFill>
-                  <a:srgbClr val="B4B4B4"/>
+                  <a:srgbClr val="969696"/>
                 </a:solidFill>
                 <a:latin typeface="Arial"/>
               </a:defRPr>
             </a:pPr>
             <a:r>
-              <a:t>Strictly Private &amp; Confidential – Project Apex</a:t>
-            </a:r>
-          </a:p>
-        </p:txBody>
-      </p:sp>
-      <p:sp>
-        <p:nvSpPr>
-          <p:cNvPr id="5" name="TextBox 4"/>
+              <a:t>Strictly Private &amp; Confidential – Prepared by Kelp M&amp;A Team</a:t>
+            </a:r>
+          </a:p>
+        </p:txBody>
+      </p:sp>
+      <p:sp>
+        <p:nvSpPr>
+          <p:cNvPr id="6" name="TextBox 5"/>
           <p:cNvSpPr txBox="1"/>
           <p:nvPr/>
         </p:nvSpPr>
@@ -3631,7 +3830,7 @@
               </a:defRPr>
             </a:pPr>
             <a:r>
-              <a:t>■ Revenue of $150M in 2022, up 10% from 2021.</a:t>
+              <a:t>■ Revenue in 2019 was $53.6 million.</a:t>
             </a:r>
           </a:p>
           <a:p>
@@ -3647,7 +3846,7 @@
               </a:defRPr>
             </a:pPr>
             <a:r>
-              <a:t>■ EBITDA margin of 18.5% in 2022.</a:t>
+              <a:t>■ EBITDA for 2020 was -$97.8 million.</a:t>
             </a:r>
           </a:p>
           <a:p>
@@ -3663,51 +3862,29 @@
               </a:defRPr>
             </a:pPr>
             <a:r>
-              <a:t>■ Headcount of 1,200 employees across operations.</a:t>
-            </a:r>
-          </a:p>
-          <a:p>
-            <a:pPr>
-              <a:spcAft>
-                <a:spcPts val="1200"/>
-              </a:spcAft>
-              <a:defRPr sz="1100">
-                <a:solidFill>
-                  <a:srgbClr val="3C3C3C"/>
-                </a:solidFill>
-                <a:latin typeface="Arial"/>
-              </a:defRPr>
-            </a:pPr>
-            <a:r>
-              <a:t>■ Asset base valued at $300M with recent CAPEX of $50M for expansion.</a:t>
-            </a:r>
-          </a:p>
-        </p:txBody>
-      </p:sp>
-      <p:pic>
-        <p:nvPicPr>
-          <p:cNvPr id="6" name="Picture 5" descr="temp_img_1.jpg"/>
-          <p:cNvPicPr>
-            <a:picLocks noChangeAspect="1"/>
-          </p:cNvPicPr>
+              <a:t>■ Net Debt as of 2021 was $23.5 million.</a:t>
+            </a:r>
+          </a:p>
+        </p:txBody>
+      </p:sp>
+      <p:graphicFrame>
+        <p:nvGraphicFramePr>
+          <p:cNvPr id="7" name="Chart 6"/>
+          <p:cNvGraphicFramePr>
+            <a:graphicFrameLocks noGrp="1"/>
+          </p:cNvGraphicFramePr>
           <p:nvPr/>
-        </p:nvPicPr>
-        <p:blipFill>
-          <a:blip r:embed="rId2"/>
-          <a:stretch>
-            <a:fillRect/>
-          </a:stretch>
-        </p:blipFill>
-        <p:spPr>
-          <a:xfrm>
-            <a:off x="5029200" y="1371600"/>
-            <a:ext cx="4114800" cy="3086100"/>
-          </a:xfrm>
-          <a:prstGeom prst="rect">
-            <a:avLst/>
-          </a:prstGeom>
-        </p:spPr>
-      </p:pic>
+        </p:nvGraphicFramePr>
+        <p:xfrm>
+          <a:off x="5029200" y="1371600"/>
+          <a:ext cx="3657600" cy="3200400"/>
+        </p:xfrm>
+        <a:graphic>
+          <a:graphicData uri="http://schemas.openxmlformats.org/drawingml/2006/chart">
+            <c:chart xmlns:c="http://schemas.openxmlformats.org/drawingml/2006/chart" r:id="rId2"/>
+          </a:graphicData>
+        </a:graphic>
+      </p:graphicFrame>
     </p:spTree>
   </p:cSld>
   <p:clrMapOvr>
@@ -3734,8 +3911,44 @@
         </p:nvSpPr>
         <p:spPr>
           <a:xfrm>
+            <a:off x="7315200" y="182880"/>
+            <a:ext cx="1371600" cy="457200"/>
+          </a:xfrm>
+          <a:prstGeom prst="rect">
+            <a:avLst/>
+          </a:prstGeom>
+          <a:noFill/>
+        </p:spPr>
+        <p:txBody>
+          <a:bodyPr wrap="none">
+            <a:spAutoFit/>
+          </a:bodyPr>
+          <a:lstStyle/>
+          <a:p>
+            <a:pPr algn="r">
+              <a:defRPr b="1" sz="1400">
+                <a:solidFill>
+                  <a:srgbClr val="2E004B"/>
+                </a:solidFill>
+                <a:latin typeface="Arial"/>
+              </a:defRPr>
+            </a:pPr>
+            <a:r>
+              <a:t>KELP</a:t>
+            </a:r>
+          </a:p>
+        </p:txBody>
+      </p:sp>
+      <p:sp>
+        <p:nvSpPr>
+          <p:cNvPr id="3" name="TextBox 2"/>
+          <p:cNvSpPr txBox="1"/>
+          <p:nvPr/>
+        </p:nvSpPr>
+        <p:spPr>
+          <a:xfrm>
             <a:off x="457200" y="365760"/>
-            <a:ext cx="8229600" cy="731520"/>
+            <a:ext cx="6858000" cy="731520"/>
           </a:xfrm>
           <a:prstGeom prst="rect">
             <a:avLst/>
@@ -3764,7 +3977,7 @@
       </p:sp>
       <p:cxnSp>
         <p:nvCxnSpPr>
-          <p:cNvPr id="3" name="Connector 2"/>
+          <p:cNvPr id="4" name="Connector 3"/>
           <p:cNvCxnSpPr/>
           <p:nvPr/>
         </p:nvCxnSpPr>
@@ -3799,7 +4012,7 @@
       </p:cxnSp>
       <p:sp>
         <p:nvSpPr>
-          <p:cNvPr id="4" name="TextBox 3"/>
+          <p:cNvPr id="5" name="TextBox 4"/>
           <p:cNvSpPr txBox="1"/>
           <p:nvPr/>
         </p:nvSpPr>
@@ -3819,23 +4032,23 @@
           </a:bodyPr>
           <a:lstStyle/>
           <a:p>
-            <a:pPr algn="r">
+            <a:pPr algn="ctr">
               <a:defRPr sz="900">
                 <a:solidFill>
-                  <a:srgbClr val="B4B4B4"/>
+                  <a:srgbClr val="969696"/>
                 </a:solidFill>
                 <a:latin typeface="Arial"/>
               </a:defRPr>
             </a:pPr>
             <a:r>
-              <a:t>Strictly Private &amp; Confidential – Project Apex</a:t>
-            </a:r>
-          </a:p>
-        </p:txBody>
-      </p:sp>
-      <p:sp>
-        <p:nvSpPr>
-          <p:cNvPr id="5" name="TextBox 4"/>
+              <a:t>Strictly Private &amp; Confidential – Prepared by Kelp M&amp;A Team</a:t>
+            </a:r>
+          </a:p>
+        </p:txBody>
+      </p:sp>
+      <p:sp>
+        <p:nvSpPr>
+          <p:cNvPr id="6" name="TextBox 5"/>
           <p:cNvSpPr txBox="1"/>
           <p:nvPr/>
         </p:nvSpPr>
@@ -3868,7 +4081,7 @@
               </a:defRPr>
             </a:pPr>
             <a:r>
-              <a:t>■ Patented manufacturing process reduces costs by 20%.</a:t>
+              <a:t>■ Order book value as of Q4 2022 was $120 million.</a:t>
             </a:r>
           </a:p>
           <a:p>
@@ -3884,15 +4097,124 @@
               </a:defRPr>
             </a:pPr>
             <a:r>
-              <a:t>■ Key client: Ford Motor Company, with long-term supply agreement.</a:t>
-            </a:r>
-          </a:p>
+              <a:t>■ Management team has over 50 years combined experience.</a:t>
+            </a:r>
+          </a:p>
+        </p:txBody>
+      </p:sp>
+    </p:spTree>
+  </p:cSld>
+  <p:clrMapOvr>
+    <a:masterClrMapping/>
+  </p:clrMapOvr>
+</p:sld>
+</file>
+
+<file path=ppt/slides/slide5.xml><?xml version="1.0" encoding="utf-8"?>
+<p:sld xmlns:a="http://schemas.openxmlformats.org/drawingml/2006/main" xmlns:p="http://schemas.openxmlformats.org/presentationml/2006/main" xmlns:r="http://schemas.openxmlformats.org/officeDocument/2006/relationships">
+  <p:cSld>
+    <p:spTree>
+      <p:nvGrpSpPr>
+        <p:cNvPr id="1" name=""/>
+        <p:cNvGrpSpPr/>
+        <p:nvPr/>
+      </p:nvGrpSpPr>
+      <p:grpSpPr/>
+      <p:sp>
+        <p:nvSpPr>
+          <p:cNvPr id="2" name="TextBox 1"/>
+          <p:cNvSpPr txBox="1"/>
+          <p:nvPr/>
+        </p:nvSpPr>
+        <p:spPr>
+          <a:xfrm>
+            <a:off x="457200" y="457200"/>
+            <a:ext cx="8229600" cy="914400"/>
+          </a:xfrm>
+          <a:prstGeom prst="rect">
+            <a:avLst/>
+          </a:prstGeom>
+          <a:noFill/>
+        </p:spPr>
+        <p:txBody>
+          <a:bodyPr wrap="none">
+            <a:spAutoFit/>
+          </a:bodyPr>
+          <a:lstStyle/>
           <a:p>
             <a:pPr>
-              <a:spcAft>
-                <a:spcPts val="1200"/>
-              </a:spcAft>
-              <a:defRPr sz="1100">
+              <a:defRPr b="1" sz="2400">
+                <a:solidFill>
+                  <a:srgbClr val="2E004B"/>
+                </a:solidFill>
+                <a:latin typeface="Arial"/>
+              </a:defRPr>
+            </a:pPr>
+            <a:r>
+              <a:t>Disclaimer</a:t>
+            </a:r>
+          </a:p>
+        </p:txBody>
+      </p:sp>
+      <p:cxnSp>
+        <p:nvCxnSpPr>
+          <p:cNvPr id="3" name="Connector 2"/>
+          <p:cNvCxnSpPr/>
+          <p:nvPr/>
+        </p:nvCxnSpPr>
+        <p:spPr>
+          <a:xfrm>
+            <a:off x="457200" y="1097280"/>
+            <a:ext cx="8229600" cy="0"/>
+          </a:xfrm>
+          <a:prstGeom prst="line">
+            <a:avLst/>
+          </a:prstGeom>
+          <a:ln w="25400">
+            <a:solidFill>
+              <a:srgbClr val="FF6450"/>
+            </a:solidFill>
+          </a:ln>
+        </p:spPr>
+        <p:style>
+          <a:lnRef idx="2">
+            <a:schemeClr val="accent1"/>
+          </a:lnRef>
+          <a:fillRef idx="0">
+            <a:schemeClr val="accent1"/>
+          </a:fillRef>
+          <a:effectRef idx="1">
+            <a:schemeClr val="accent1"/>
+          </a:effectRef>
+          <a:fontRef idx="minor">
+            <a:schemeClr val="tx1"/>
+          </a:fontRef>
+        </p:style>
+      </p:cxnSp>
+      <p:sp>
+        <p:nvSpPr>
+          <p:cNvPr id="4" name="TextBox 3"/>
+          <p:cNvSpPr txBox="1"/>
+          <p:nvPr/>
+        </p:nvSpPr>
+        <p:spPr>
+          <a:xfrm>
+            <a:off x="457200" y="1371600"/>
+            <a:ext cx="8229600" cy="4572000"/>
+          </a:xfrm>
+          <a:prstGeom prst="rect">
+            <a:avLst/>
+          </a:prstGeom>
+          <a:noFill/>
+        </p:spPr>
+        <p:txBody>
+          <a:bodyPr wrap="square">
+            <a:spAutoFit/>
+          </a:bodyPr>
+          <a:lstStyle/>
+          <a:p>
+            <a:pPr algn="just">
+              <a:defRPr sz="1000">
                 <a:solidFill>
                   <a:srgbClr val="3C3C3C"/>
                 </a:solidFill>
@@ -3900,51 +4222,57 @@
               </a:defRPr>
             </a:pPr>
             <a:r>
-              <a:t>■ Order book for next 12 months exceeds $200M.</a:t>
-            </a:r>
-          </a:p>
-          <a:p>
-            <a:pPr>
-              <a:spcAft>
-                <a:spcPts val="1200"/>
-              </a:spcAft>
-              <a:defRPr sz="1100">
+              <a:t>This presentation is strictly confidential and is being provided to you solely for your information. By accepting this presentation, you agree to keep it confidential and not to distribute it to any other person.</a:t>
+            </a:r>
+            <a:br/>
+            <a:br/>
+            <a:r>
+              <a:t>This document does not constitute an offer to sell or a solicitation of an offer to buy any securities. The information contained herein has been obtained from sources believed to be reliable but is not guaranteed as to accuracy or completeness. Project Apex and Kelp M&amp;A Team make no representation or warranty regarding the accuracy of the information.</a:t>
+            </a:r>
+            <a:br/>
+            <a:br/>
+            <a:r>
+              <a:t>This presentation may contain forward-looking statements that involve risks and uncertainties. Actual results may differ materially from those projected.</a:t>
+            </a:r>
+          </a:p>
+        </p:txBody>
+      </p:sp>
+      <p:sp>
+        <p:nvSpPr>
+          <p:cNvPr id="5" name="TextBox 4"/>
+          <p:cNvSpPr txBox="1"/>
+          <p:nvPr/>
+        </p:nvSpPr>
+        <p:spPr>
+          <a:xfrm>
+            <a:off x="457200" y="6492240"/>
+            <a:ext cx="8229600" cy="365760"/>
+          </a:xfrm>
+          <a:prstGeom prst="rect">
+            <a:avLst/>
+          </a:prstGeom>
+          <a:noFill/>
+        </p:spPr>
+        <p:txBody>
+          <a:bodyPr wrap="none">
+            <a:spAutoFit/>
+          </a:bodyPr>
+          <a:lstStyle/>
+          <a:p>
+            <a:pPr algn="ctr">
+              <a:defRPr sz="900">
                 <a:solidFill>
-                  <a:srgbClr val="3C3C3C"/>
+                  <a:srgbClr val="969696"/>
                 </a:solidFill>
                 <a:latin typeface="Arial"/>
               </a:defRPr>
             </a:pPr>
             <a:r>
-              <a:t>■ Management team has over 100 years of combined experience in automotive industry.</a:t>
-            </a:r>
-          </a:p>
-        </p:txBody>
-      </p:sp>
-      <p:pic>
-        <p:nvPicPr>
-          <p:cNvPr id="6" name="Picture 5" descr="temp_img_2.jpg"/>
-          <p:cNvPicPr>
-            <a:picLocks noChangeAspect="1"/>
-          </p:cNvPicPr>
-          <p:nvPr/>
-        </p:nvPicPr>
-        <p:blipFill>
-          <a:blip r:embed="rId2"/>
-          <a:stretch>
-            <a:fillRect/>
-          </a:stretch>
-        </p:blipFill>
-        <p:spPr>
-          <a:xfrm>
-            <a:off x="5029200" y="1371600"/>
-            <a:ext cx="4114800" cy="3086100"/>
-          </a:xfrm>
-          <a:prstGeom prst="rect">
-            <a:avLst/>
-          </a:prstGeom>
-        </p:spPr>
-      </p:pic>
+              <a:t>Strictly Private &amp; Confidential – Prepared by Kelp M&amp;A Team</a:t>
+            </a:r>
+          </a:p>
+        </p:txBody>
+      </p:sp>
     </p:spTree>
   </p:cSld>
   <p:clrMapOvr>

</xml_diff>